<commit_message>
update reports and powerpoints
</commit_message>
<xml_diff>
--- a/Citation_Py_PPT.pptx
+++ b/Citation_Py_PPT.pptx
@@ -217,7 +217,7 @@
           <a:p>
             <a:fld id="{437F1CFE-D682-488A-92CC-A9FEB0AF6926}" type="datetimeFigureOut">
               <a:rPr lang="en-US" smtClean="0"/>
-              <a:t>3/29/2019</a:t>
+              <a:t>3/30/2019</a:t>
             </a:fld>
             <a:endParaRPr lang="en-US"/>
           </a:p>
@@ -568,6 +568,90 @@
 </p:notes>
 </file>
 
+<file path=ppt/notesSlides/notesSlide2.xml><?xml version="1.0" encoding="utf-8"?>
+<p:notes xmlns:a="http://schemas.openxmlformats.org/drawingml/2006/main" xmlns:r="http://schemas.openxmlformats.org/officeDocument/2006/relationships" xmlns:p="http://schemas.openxmlformats.org/presentationml/2006/main">
+  <p:cSld>
+    <p:spTree>
+      <p:nvGrpSpPr>
+        <p:cNvPr id="1" name=""/>
+        <p:cNvGrpSpPr/>
+        <p:nvPr/>
+      </p:nvGrpSpPr>
+      <p:grpSpPr>
+        <a:xfrm>
+          <a:off x="0" y="0"/>
+          <a:ext cx="0" cy="0"/>
+          <a:chOff x="0" y="0"/>
+          <a:chExt cx="0" cy="0"/>
+        </a:xfrm>
+      </p:grpSpPr>
+      <p:sp>
+        <p:nvSpPr>
+          <p:cNvPr id="2" name="Slide Image Placeholder 1"/>
+          <p:cNvSpPr>
+            <a:spLocks noGrp="1" noRot="1" noChangeAspect="1"/>
+          </p:cNvSpPr>
+          <p:nvPr>
+            <p:ph type="sldImg"/>
+          </p:nvPr>
+        </p:nvSpPr>
+        <p:spPr/>
+      </p:sp>
+      <p:sp>
+        <p:nvSpPr>
+          <p:cNvPr id="3" name="Notes Placeholder 2"/>
+          <p:cNvSpPr>
+            <a:spLocks noGrp="1"/>
+          </p:cNvSpPr>
+          <p:nvPr>
+            <p:ph type="body" idx="1"/>
+          </p:nvPr>
+        </p:nvSpPr>
+        <p:spPr/>
+        <p:txBody>
+          <a:bodyPr/>
+          <a:lstStyle/>
+          <a:p>
+            <a:endParaRPr lang="en-US" dirty="0"/>
+          </a:p>
+        </p:txBody>
+      </p:sp>
+      <p:sp>
+        <p:nvSpPr>
+          <p:cNvPr id="4" name="Slide Number Placeholder 3"/>
+          <p:cNvSpPr>
+            <a:spLocks noGrp="1"/>
+          </p:cNvSpPr>
+          <p:nvPr>
+            <p:ph type="sldNum" sz="quarter" idx="5"/>
+          </p:nvPr>
+        </p:nvSpPr>
+        <p:spPr/>
+        <p:txBody>
+          <a:bodyPr/>
+          <a:lstStyle/>
+          <a:p>
+            <a:fld id="{919F0A8F-196C-438F-BA5D-9F0E0DFF5B98}" type="slidenum">
+              <a:rPr lang="en-US" smtClean="0"/>
+              <a:t>21</a:t>
+            </a:fld>
+            <a:endParaRPr lang="en-US"/>
+          </a:p>
+        </p:txBody>
+      </p:sp>
+    </p:spTree>
+    <p:extLst>
+      <p:ext uri="{BB962C8B-B14F-4D97-AF65-F5344CB8AC3E}">
+        <p14:creationId xmlns:p14="http://schemas.microsoft.com/office/powerpoint/2010/main" val="3026462829"/>
+      </p:ext>
+    </p:extLst>
+  </p:cSld>
+  <p:clrMapOvr>
+    <a:masterClrMapping/>
+  </p:clrMapOvr>
+</p:notes>
+</file>
+
 <file path=ppt/slideLayouts/slideLayout1.xml><?xml version="1.0" encoding="utf-8"?>
 <p:sldLayout xmlns:a="http://schemas.openxmlformats.org/drawingml/2006/main" xmlns:r="http://schemas.openxmlformats.org/officeDocument/2006/relationships" xmlns:p="http://schemas.openxmlformats.org/presentationml/2006/main" type="title" preserve="1">
   <p:cSld name="Title Slide">
@@ -715,7 +799,7 @@
           <a:p>
             <a:fld id="{069DAEA1-0E28-4931-8785-278C14BD5B33}" type="datetimeFigureOut">
               <a:rPr lang="en-US" smtClean="0"/>
-              <a:t>3/29/2019</a:t>
+              <a:t>3/30/2019</a:t>
             </a:fld>
             <a:endParaRPr lang="en-US"/>
           </a:p>
@@ -913,7 +997,7 @@
           <a:p>
             <a:fld id="{069DAEA1-0E28-4931-8785-278C14BD5B33}" type="datetimeFigureOut">
               <a:rPr lang="en-US" smtClean="0"/>
-              <a:t>3/29/2019</a:t>
+              <a:t>3/30/2019</a:t>
             </a:fld>
             <a:endParaRPr lang="en-US"/>
           </a:p>
@@ -1121,7 +1205,7 @@
           <a:p>
             <a:fld id="{069DAEA1-0E28-4931-8785-278C14BD5B33}" type="datetimeFigureOut">
               <a:rPr lang="en-US" smtClean="0"/>
-              <a:t>3/29/2019</a:t>
+              <a:t>3/30/2019</a:t>
             </a:fld>
             <a:endParaRPr lang="en-US"/>
           </a:p>
@@ -1319,7 +1403,7 @@
           <a:p>
             <a:fld id="{069DAEA1-0E28-4931-8785-278C14BD5B33}" type="datetimeFigureOut">
               <a:rPr lang="en-US" smtClean="0"/>
-              <a:t>3/29/2019</a:t>
+              <a:t>3/30/2019</a:t>
             </a:fld>
             <a:endParaRPr lang="en-US"/>
           </a:p>
@@ -1594,7 +1678,7 @@
           <a:p>
             <a:fld id="{069DAEA1-0E28-4931-8785-278C14BD5B33}" type="datetimeFigureOut">
               <a:rPr lang="en-US" smtClean="0"/>
-              <a:t>3/29/2019</a:t>
+              <a:t>3/30/2019</a:t>
             </a:fld>
             <a:endParaRPr lang="en-US"/>
           </a:p>
@@ -1859,7 +1943,7 @@
           <a:p>
             <a:fld id="{069DAEA1-0E28-4931-8785-278C14BD5B33}" type="datetimeFigureOut">
               <a:rPr lang="en-US" smtClean="0"/>
-              <a:t>3/29/2019</a:t>
+              <a:t>3/30/2019</a:t>
             </a:fld>
             <a:endParaRPr lang="en-US"/>
           </a:p>
@@ -2271,7 +2355,7 @@
           <a:p>
             <a:fld id="{069DAEA1-0E28-4931-8785-278C14BD5B33}" type="datetimeFigureOut">
               <a:rPr lang="en-US" smtClean="0"/>
-              <a:t>3/29/2019</a:t>
+              <a:t>3/30/2019</a:t>
             </a:fld>
             <a:endParaRPr lang="en-US"/>
           </a:p>
@@ -2412,7 +2496,7 @@
           <a:p>
             <a:fld id="{069DAEA1-0E28-4931-8785-278C14BD5B33}" type="datetimeFigureOut">
               <a:rPr lang="en-US" smtClean="0"/>
-              <a:t>3/29/2019</a:t>
+              <a:t>3/30/2019</a:t>
             </a:fld>
             <a:endParaRPr lang="en-US"/>
           </a:p>
@@ -2525,7 +2609,7 @@
           <a:p>
             <a:fld id="{069DAEA1-0E28-4931-8785-278C14BD5B33}" type="datetimeFigureOut">
               <a:rPr lang="en-US" smtClean="0"/>
-              <a:t>3/29/2019</a:t>
+              <a:t>3/30/2019</a:t>
             </a:fld>
             <a:endParaRPr lang="en-US"/>
           </a:p>
@@ -2836,7 +2920,7 @@
           <a:p>
             <a:fld id="{069DAEA1-0E28-4931-8785-278C14BD5B33}" type="datetimeFigureOut">
               <a:rPr lang="en-US" smtClean="0"/>
-              <a:t>3/29/2019</a:t>
+              <a:t>3/30/2019</a:t>
             </a:fld>
             <a:endParaRPr lang="en-US"/>
           </a:p>
@@ -3124,7 +3208,7 @@
           <a:p>
             <a:fld id="{069DAEA1-0E28-4931-8785-278C14BD5B33}" type="datetimeFigureOut">
               <a:rPr lang="en-US" smtClean="0"/>
-              <a:t>3/29/2019</a:t>
+              <a:t>3/30/2019</a:t>
             </a:fld>
             <a:endParaRPr lang="en-US"/>
           </a:p>
@@ -3395,7 +3479,7 @@
           <a:p>
             <a:fld id="{069DAEA1-0E28-4931-8785-278C14BD5B33}" type="datetimeFigureOut">
               <a:rPr lang="en-US" smtClean="0"/>
-              <a:t>3/29/2019</a:t>
+              <a:t>3/30/2019</a:t>
             </a:fld>
             <a:endParaRPr lang="en-US"/>
           </a:p>
@@ -4113,15 +4197,7 @@
           <a:p>
             <a:r>
               <a:rPr lang="en-US" b="1" dirty="0"/>
-              <a:t>Findings: Makes vs. </a:t>
-            </a:r>
-            <a:r>
-              <a:rPr lang="en-US" b="1" dirty="0">
-                <a:solidFill>
-                  <a:srgbClr val="FF0000"/>
-                </a:solidFill>
-              </a:rPr>
-              <a:t>Citations</a:t>
+              <a:t>Findings: Makes vs. Citations</a:t>
             </a:r>
             <a:br>
               <a:rPr lang="en-US" dirty="0"/>
@@ -4130,41 +4206,6 @@
           </a:p>
         </p:txBody>
       </p:sp>
-      <p:pic>
-        <p:nvPicPr>
-          <p:cNvPr id="5" name="Content Placeholder 4">
-            <a:extLst>
-              <a:ext uri="{FF2B5EF4-FFF2-40B4-BE49-F238E27FC236}">
-                <a16:creationId xmlns:a16="http://schemas.microsoft.com/office/drawing/2014/main" id="{2D99669C-0B9C-485D-BAAC-E8E7E5B35A38}"/>
-              </a:ext>
-            </a:extLst>
-          </p:cNvPr>
-          <p:cNvPicPr>
-            <a:picLocks noGrp="1" noChangeAspect="1"/>
-          </p:cNvPicPr>
-          <p:nvPr>
-            <p:ph idx="1"/>
-          </p:nvPr>
-        </p:nvPicPr>
-        <p:blipFill>
-          <a:blip r:embed="rId2">
-            <a:extLst>
-              <a:ext uri="{28A0092B-C50C-407E-A947-70E740481C1C}">
-                <a14:useLocalDpi xmlns:a14="http://schemas.microsoft.com/office/drawing/2010/main" val="0"/>
-              </a:ext>
-            </a:extLst>
-          </a:blip>
-          <a:stretch>
-            <a:fillRect/>
-          </a:stretch>
-        </p:blipFill>
-        <p:spPr>
-          <a:xfrm>
-            <a:off x="2105891" y="1825625"/>
-            <a:ext cx="8455429" cy="4351338"/>
-          </a:xfrm>
-        </p:spPr>
-      </p:pic>
       <p:sp>
         <p:nvSpPr>
           <p:cNvPr id="3" name="Rectangle 2">
@@ -4204,6 +4245,41 @@
           </a:p>
         </p:txBody>
       </p:sp>
+      <p:pic>
+        <p:nvPicPr>
+          <p:cNvPr id="8" name="Content Placeholder 7" descr="A screenshot of a cell phone&#10;&#10;Description automatically generated">
+            <a:extLst>
+              <a:ext uri="{FF2B5EF4-FFF2-40B4-BE49-F238E27FC236}">
+                <a16:creationId xmlns:a16="http://schemas.microsoft.com/office/drawing/2014/main" id="{3F78B689-C31D-495F-8A8B-977DE2B2BE67}"/>
+              </a:ext>
+            </a:extLst>
+          </p:cNvPr>
+          <p:cNvPicPr>
+            <a:picLocks noGrp="1" noChangeAspect="1"/>
+          </p:cNvPicPr>
+          <p:nvPr>
+            <p:ph idx="1"/>
+          </p:nvPr>
+        </p:nvPicPr>
+        <p:blipFill>
+          <a:blip r:embed="rId2">
+            <a:extLst>
+              <a:ext uri="{28A0092B-C50C-407E-A947-70E740481C1C}">
+                <a14:useLocalDpi xmlns:a14="http://schemas.microsoft.com/office/drawing/2010/main" val="0"/>
+              </a:ext>
+            </a:extLst>
+          </a:blip>
+          <a:stretch>
+            <a:fillRect/>
+          </a:stretch>
+        </p:blipFill>
+        <p:spPr>
+          <a:xfrm>
+            <a:off x="3464615" y="1840533"/>
+            <a:ext cx="5262770" cy="4351338"/>
+          </a:xfrm>
+        </p:spPr>
+      </p:pic>
     </p:spTree>
     <p:extLst>
       <p:ext uri="{BB962C8B-B14F-4D97-AF65-F5344CB8AC3E}">
@@ -6476,12 +6552,14 @@
         </p:nvSpPr>
         <p:spPr/>
         <p:txBody>
-          <a:bodyPr/>
+          <a:bodyPr>
+            <a:normAutofit lnSpcReduction="10000"/>
+          </a:bodyPr>
           <a:lstStyle/>
           <a:p>
             <a:r>
               <a:rPr lang="en-US" dirty="0"/>
-              <a:t>Observed distribution is significantly different from expected distribution indicates there is no relationship   </a:t>
+              <a:t>Observed distribution is significantly different from expected distribution indicates there is no relationship </a:t>
             </a:r>
           </a:p>
           <a:p>
@@ -6494,6 +6572,9 @@
             </a:r>
           </a:p>
           <a:p>
+            <a:endParaRPr lang="en-US" dirty="0"/>
+          </a:p>
+          <a:p>
             <a:r>
               <a:rPr lang="en-US" dirty="0"/>
               <a:t>There is a statistically significant evidence at α=0.05 to show that H</a:t>
@@ -6506,6 +6587,9 @@
               <a:rPr lang="en-US" dirty="0"/>
               <a:t> is false</a:t>
             </a:r>
+          </a:p>
+          <a:p>
+            <a:endParaRPr lang="en-US" dirty="0"/>
           </a:p>
           <a:p>
             <a:r>
@@ -7508,7 +7592,7 @@
           <a:p>
             <a:r>
               <a:rPr lang="en-US" b="1" dirty="0"/>
-              <a:t>Conclusions:</a:t>
+              <a:t>Conclusions</a:t>
             </a:r>
             <a:br>
               <a:rPr lang="en-US" dirty="0"/>
@@ -7540,7 +7624,7 @@
           <a:p>
             <a:r>
               <a:rPr lang="en-US" dirty="0"/>
-              <a:t>The top five vehicles who receive the highest citations are Toyota, Honda, Ford, and Nissan among the 25 different models of vehicles</a:t>
+              <a:t>The top five vehicles that received the highest citations were Toyota, Honda, Ford, and Nissan among the 25 different models of vehicles</a:t>
             </a:r>
           </a:p>
           <a:p>
@@ -7552,7 +7636,13 @@
           <a:p>
             <a:r>
               <a:rPr lang="en-US" dirty="0"/>
-              <a:t>There is no significant relationships or association between makes of cars and the number of citations received within different samples.   </a:t>
+              <a:t>There is no significant relationships or association between makes of cars and the number of citations received within different samples. </a:t>
+            </a:r>
+          </a:p>
+          <a:p>
+            <a:r>
+              <a:rPr lang="en-US" dirty="0"/>
+              <a:t>There is no relationships or association between citations and restaurant locations.  </a:t>
             </a:r>
           </a:p>
         </p:txBody>
@@ -7609,8 +7699,8 @@
           <a:lstStyle/>
           <a:p>
             <a:r>
-              <a:rPr lang="en-US" b="1" dirty="0"/>
-              <a:t>Recommendations:</a:t>
+              <a:rPr lang="en-US" b="1"/>
+              <a:t>Recommendations</a:t>
             </a:r>
             <a:br>
               <a:rPr lang="en-US" dirty="0"/>
@@ -7640,7 +7730,31 @@
           <a:bodyPr/>
           <a:lstStyle/>
           <a:p>
+            <a:r>
+              <a:rPr lang="en-US" dirty="0"/>
+              <a:t>From our evaluation of the data used we recommend that you park in designated areas and do not violate the parking laws.</a:t>
+            </a:r>
+          </a:p>
+          <a:p>
+            <a:pPr marL="0" indent="0">
+              <a:buNone/>
+            </a:pPr>
             <a:endParaRPr lang="en-US" dirty="0"/>
+          </a:p>
+          <a:p>
+            <a:r>
+              <a:rPr lang="en-US" dirty="0"/>
+              <a:t>The Analysis is limited to the sample data set of May – July of 2018.</a:t>
+            </a:r>
+          </a:p>
+          <a:p>
+            <a:endParaRPr lang="en-US" dirty="0"/>
+          </a:p>
+          <a:p>
+            <a:r>
+              <a:rPr lang="en-US" dirty="0"/>
+              <a:t>Use a more current dataset to further evaluate the findings.</a:t>
+            </a:r>
           </a:p>
         </p:txBody>
       </p:sp>
@@ -7726,13 +7840,13 @@
         <p:spPr/>
         <p:txBody>
           <a:bodyPr>
-            <a:normAutofit/>
+            <a:normAutofit lnSpcReduction="10000"/>
           </a:bodyPr>
           <a:lstStyle/>
           <a:p>
             <a:r>
               <a:rPr lang="en-US" dirty="0"/>
-              <a:t>Uncover patterns citation patterns around the city of Los Angeles.</a:t>
+              <a:t>Uncover citation patterns around the city of Los Angeles.</a:t>
             </a:r>
           </a:p>
           <a:p>
@@ -7752,6 +7866,12 @@
               <a:rPr lang="en-US" dirty="0"/>
               <a:t>Explore the a relationship between the colors of vehicles and parking citations. </a:t>
             </a:r>
+          </a:p>
+          <a:p>
+            <a:pPr marL="0" indent="0">
+              <a:buNone/>
+            </a:pPr>
+            <a:endParaRPr lang="en-US" dirty="0"/>
           </a:p>
           <a:p>
             <a:r>
@@ -7814,7 +7934,7 @@
           <a:p>
             <a:r>
               <a:rPr lang="en-US" b="1" dirty="0"/>
-              <a:t>Methodology:</a:t>
+              <a:t>Methodology</a:t>
             </a:r>
             <a:br>
               <a:rPr lang="en-US" dirty="0"/>
@@ -7968,21 +8088,21 @@
             <a:pPr lvl="0"/>
             <a:r>
               <a:rPr lang="en-US" dirty="0"/>
-              <a:t>Folium Mapping.</a:t>
+              <a:t>Folium Mapping</a:t>
             </a:r>
           </a:p>
           <a:p>
             <a:pPr lvl="0"/>
             <a:r>
               <a:rPr lang="en-US" dirty="0"/>
-              <a:t>Jupiter notebook.</a:t>
+              <a:t>Jupiter notebook</a:t>
             </a:r>
           </a:p>
           <a:p>
             <a:pPr lvl="0"/>
             <a:r>
               <a:rPr lang="en-US" dirty="0"/>
-              <a:t>Git Hub.</a:t>
+              <a:t>Git Hub</a:t>
             </a:r>
           </a:p>
           <a:p>
@@ -8083,7 +8203,7 @@
         </p:spPr>
         <p:txBody>
           <a:bodyPr>
-            <a:normAutofit fontScale="77500" lnSpcReduction="20000"/>
+            <a:normAutofit fontScale="70000" lnSpcReduction="20000"/>
           </a:bodyPr>
           <a:lstStyle/>
           <a:p>
@@ -8200,6 +8320,12 @@
               <a:rPr lang="en-US" dirty="0"/>
               <a:t>Q3. Are the means of the citations received of two groups of vehicles different (independent)? </a:t>
             </a:r>
+          </a:p>
+          <a:p>
+            <a:pPr marL="0" lvl="0" indent="0">
+              <a:buNone/>
+            </a:pPr>
+            <a:endParaRPr lang="en-US" dirty="0"/>
           </a:p>
           <a:p>
             <a:pPr marL="457200" lvl="1" indent="0">

</xml_diff>